<commit_message>
added slides for exercises
</commit_message>
<xml_diff>
--- a/org.faktorips.doc/schulung/anwendungsentwicklung2/FaktorIPS-Schulung 3-E - Aufzaehlungen.pptx
+++ b/org.faktorips.doc/schulung/anwendungsentwicklung2/FaktorIPS-Schulung 3-E - Aufzaehlungen.pptx
@@ -5,17 +5,19 @@
     <p:sldMasterId id="2147483651" r:id="rId1"/>
   </p:sldMasterIdLst>
   <p:notesMasterIdLst>
-    <p:notesMasterId r:id="rId7"/>
+    <p:notesMasterId r:id="rId9"/>
   </p:notesMasterIdLst>
   <p:handoutMasterIdLst>
-    <p:handoutMasterId r:id="rId8"/>
+    <p:handoutMasterId r:id="rId10"/>
   </p:handoutMasterIdLst>
   <p:sldIdLst>
     <p:sldId id="428" r:id="rId2"/>
     <p:sldId id="429" r:id="rId3"/>
     <p:sldId id="430" r:id="rId4"/>
-    <p:sldId id="431" r:id="rId5"/>
-    <p:sldId id="432" r:id="rId6"/>
+    <p:sldId id="433" r:id="rId5"/>
+    <p:sldId id="431" r:id="rId6"/>
+    <p:sldId id="432" r:id="rId7"/>
+    <p:sldId id="434" r:id="rId8"/>
   </p:sldIdLst>
   <p:sldSz cx="9144000" cy="6858000" type="screen4x3"/>
   <p:notesSz cx="6718300" cy="9855200"/>
@@ -152,8 +154,10 @@
             <p14:sldId id="428"/>
             <p14:sldId id="429"/>
             <p14:sldId id="430"/>
+            <p14:sldId id="433"/>
             <p14:sldId id="431"/>
             <p14:sldId id="432"/>
+            <p14:sldId id="434"/>
           </p14:sldIdLst>
         </p14:section>
       </p14:sectionLst>
@@ -854,6 +858,222 @@
 </p:notesMaster>
 </file>
 
+<file path=ppt/notesSlides/notesSlide1.xml><?xml version="1.0" encoding="utf-8"?>
+<p:notes xmlns:a="http://schemas.openxmlformats.org/drawingml/2006/main" xmlns:r="http://schemas.openxmlformats.org/officeDocument/2006/relationships" xmlns:p="http://schemas.openxmlformats.org/presentationml/2006/main">
+  <p:cSld>
+    <p:bg>
+      <p:bgPr>
+        <a:solidFill>
+          <a:srgbClr val="FFFFFF"/>
+        </a:solidFill>
+        <a:effectLst/>
+      </p:bgPr>
+    </p:bg>
+    <p:spTree>
+      <p:nvGrpSpPr>
+        <p:cNvPr id="1" name=""/>
+        <p:cNvGrpSpPr/>
+        <p:nvPr/>
+      </p:nvGrpSpPr>
+      <p:grpSpPr>
+        <a:xfrm>
+          <a:off x="0" y="0"/>
+          <a:ext cx="0" cy="0"/>
+          <a:chOff x="0" y="0"/>
+          <a:chExt cx="0" cy="0"/>
+        </a:xfrm>
+      </p:grpSpPr>
+      <p:sp>
+        <p:nvSpPr>
+          <p:cNvPr id="29698" name="Rectangle 1"/>
+          <p:cNvSpPr>
+            <a:spLocks noGrp="1" noRot="1" noChangeAspect="1" noChangeArrowheads="1" noTextEdit="1"/>
+          </p:cNvSpPr>
+          <p:nvPr>
+            <p:ph type="sldImg"/>
+          </p:nvPr>
+        </p:nvSpPr>
+        <p:spPr>
+          <a:xfrm>
+            <a:off x="952500" y="773113"/>
+            <a:ext cx="4867275" cy="3651250"/>
+          </a:xfrm>
+          <a:solidFill>
+            <a:srgbClr val="FFFFFF"/>
+          </a:solidFill>
+          <a:ln>
+            <a:solidFill>
+              <a:srgbClr val="000000"/>
+            </a:solidFill>
+            <a:miter lim="800000"/>
+            <a:headEnd/>
+            <a:tailEnd/>
+          </a:ln>
+          <a:extLst>
+            <a:ext uri="{AF507438-7753-43E0-B8FC-AC1667EBCBE1}">
+              <a14:hiddenEffects xmlns:a14="http://schemas.microsoft.com/office/drawing/2010/main">
+                <a:effectLst>
+                  <a:outerShdw dist="35921" dir="2700000" algn="ctr" rotWithShape="0">
+                    <a:srgbClr val="808080"/>
+                  </a:outerShdw>
+                </a:effectLst>
+              </a14:hiddenEffects>
+            </a:ext>
+          </a:extLst>
+        </p:spPr>
+      </p:sp>
+      <p:sp>
+        <p:nvSpPr>
+          <p:cNvPr id="29699" name="Rectangle 2"/>
+          <p:cNvSpPr>
+            <a:spLocks noGrp="1" noChangeArrowheads="1"/>
+          </p:cNvSpPr>
+          <p:nvPr>
+            <p:ph type="body" idx="1"/>
+          </p:nvPr>
+        </p:nvSpPr>
+        <p:spPr>
+          <a:xfrm>
+            <a:off x="881064" y="4705350"/>
+            <a:ext cx="4943475" cy="4425950"/>
+          </a:xfrm>
+          <a:noFill/>
+          <a:extLst>
+            <a:ext uri="{AF507438-7753-43E0-B8FC-AC1667EBCBE1}">
+              <a14:hiddenEffects xmlns:a14="http://schemas.microsoft.com/office/drawing/2010/main">
+                <a:effectLst>
+                  <a:outerShdw dist="35921" dir="2700000" algn="ctr" rotWithShape="0">
+                    <a:srgbClr val="808080"/>
+                  </a:outerShdw>
+                </a:effectLst>
+              </a14:hiddenEffects>
+            </a:ext>
+          </a:extLst>
+        </p:spPr>
+        <p:txBody>
+          <a:bodyPr wrap="none" anchor="ctr"/>
+          <a:lstStyle/>
+          <a:p>
+            <a:endParaRPr lang="de-DE" smtClean="0"/>
+          </a:p>
+        </p:txBody>
+      </p:sp>
+    </p:spTree>
+  </p:cSld>
+  <p:clrMapOvr>
+    <a:masterClrMapping/>
+  </p:clrMapOvr>
+</p:notes>
+</file>
+
+<file path=ppt/notesSlides/notesSlide2.xml><?xml version="1.0" encoding="utf-8"?>
+<p:notes xmlns:a="http://schemas.openxmlformats.org/drawingml/2006/main" xmlns:r="http://schemas.openxmlformats.org/officeDocument/2006/relationships" xmlns:p="http://schemas.openxmlformats.org/presentationml/2006/main">
+  <p:cSld>
+    <p:bg>
+      <p:bgPr>
+        <a:solidFill>
+          <a:srgbClr val="FFFFFF"/>
+        </a:solidFill>
+        <a:effectLst/>
+      </p:bgPr>
+    </p:bg>
+    <p:spTree>
+      <p:nvGrpSpPr>
+        <p:cNvPr id="1" name=""/>
+        <p:cNvGrpSpPr/>
+        <p:nvPr/>
+      </p:nvGrpSpPr>
+      <p:grpSpPr>
+        <a:xfrm>
+          <a:off x="0" y="0"/>
+          <a:ext cx="0" cy="0"/>
+          <a:chOff x="0" y="0"/>
+          <a:chExt cx="0" cy="0"/>
+        </a:xfrm>
+      </p:grpSpPr>
+      <p:sp>
+        <p:nvSpPr>
+          <p:cNvPr id="29698" name="Rectangle 1"/>
+          <p:cNvSpPr>
+            <a:spLocks noGrp="1" noRot="1" noChangeAspect="1" noChangeArrowheads="1" noTextEdit="1"/>
+          </p:cNvSpPr>
+          <p:nvPr>
+            <p:ph type="sldImg"/>
+          </p:nvPr>
+        </p:nvSpPr>
+        <p:spPr>
+          <a:xfrm>
+            <a:off x="952500" y="773113"/>
+            <a:ext cx="4867275" cy="3651250"/>
+          </a:xfrm>
+          <a:solidFill>
+            <a:srgbClr val="FFFFFF"/>
+          </a:solidFill>
+          <a:ln>
+            <a:solidFill>
+              <a:srgbClr val="000000"/>
+            </a:solidFill>
+            <a:miter lim="800000"/>
+            <a:headEnd/>
+            <a:tailEnd/>
+          </a:ln>
+          <a:extLst>
+            <a:ext uri="{AF507438-7753-43E0-B8FC-AC1667EBCBE1}">
+              <a14:hiddenEffects xmlns:a14="http://schemas.microsoft.com/office/drawing/2010/main">
+                <a:effectLst>
+                  <a:outerShdw dist="35921" dir="2700000" algn="ctr" rotWithShape="0">
+                    <a:srgbClr val="808080"/>
+                  </a:outerShdw>
+                </a:effectLst>
+              </a14:hiddenEffects>
+            </a:ext>
+          </a:extLst>
+        </p:spPr>
+      </p:sp>
+      <p:sp>
+        <p:nvSpPr>
+          <p:cNvPr id="29699" name="Rectangle 2"/>
+          <p:cNvSpPr>
+            <a:spLocks noGrp="1" noChangeArrowheads="1"/>
+          </p:cNvSpPr>
+          <p:nvPr>
+            <p:ph type="body" idx="1"/>
+          </p:nvPr>
+        </p:nvSpPr>
+        <p:spPr>
+          <a:xfrm>
+            <a:off x="881064" y="4705350"/>
+            <a:ext cx="4943475" cy="4425950"/>
+          </a:xfrm>
+          <a:noFill/>
+          <a:extLst>
+            <a:ext uri="{AF507438-7753-43E0-B8FC-AC1667EBCBE1}">
+              <a14:hiddenEffects xmlns:a14="http://schemas.microsoft.com/office/drawing/2010/main">
+                <a:effectLst>
+                  <a:outerShdw dist="35921" dir="2700000" algn="ctr" rotWithShape="0">
+                    <a:srgbClr val="808080"/>
+                  </a:outerShdw>
+                </a:effectLst>
+              </a14:hiddenEffects>
+            </a:ext>
+          </a:extLst>
+        </p:spPr>
+        <p:txBody>
+          <a:bodyPr wrap="none" anchor="ctr"/>
+          <a:lstStyle/>
+          <a:p>
+            <a:endParaRPr lang="de-DE" smtClean="0"/>
+          </a:p>
+        </p:txBody>
+      </p:sp>
+    </p:spTree>
+  </p:cSld>
+  <p:clrMapOvr>
+    <a:masterClrMapping/>
+  </p:clrMapOvr>
+</p:notes>
+</file>
+
 <file path=ppt/slideLayouts/slideLayout1.xml><?xml version="1.0" encoding="utf-8"?>
 <p:sldLayout xmlns:a="http://schemas.openxmlformats.org/drawingml/2006/main" xmlns:r="http://schemas.openxmlformats.org/officeDocument/2006/relationships" xmlns:p="http://schemas.openxmlformats.org/presentationml/2006/main" preserve="1" userDrawn="1">
   <p:cSld name="Structure">
@@ -946,7 +1166,7 @@
           <a:p>
             <a:fld id="{5246559C-FC1A-404F-A8AB-76DC7F87C0B6}" type="datetime1">
               <a:rPr lang="de-DE" smtClean="0"/>
-              <a:t>17.05.2013</a:t>
+              <a:t>18.11.2013</a:t>
             </a:fld>
             <a:endParaRPr lang="de-DE" dirty="0"/>
           </a:p>
@@ -2279,7 +2499,7 @@
           <a:p>
             <a:fld id="{32F44C90-5CB7-448F-AAF5-B7206B35F77C}" type="datetime1">
               <a:rPr lang="de-DE" smtClean="0"/>
-              <a:t>17.05.2013</a:t>
+              <a:t>18.11.2013</a:t>
             </a:fld>
             <a:endParaRPr lang="de-DE" dirty="0"/>
           </a:p>
@@ -2476,7 +2696,7 @@
           <a:p>
             <a:fld id="{5C66796F-2262-49A0-8852-F080F733A627}" type="datetime1">
               <a:rPr lang="de-DE" smtClean="0"/>
-              <a:t>17.05.2013</a:t>
+              <a:t>18.11.2013</a:t>
             </a:fld>
             <a:endParaRPr lang="de-DE" dirty="0"/>
           </a:p>
@@ -3418,7 +3638,7 @@
           <a:p>
             <a:fld id="{107F8651-35C6-4CC8-90DB-6EE10284C05A}" type="datetime1">
               <a:rPr lang="de-DE" smtClean="0"/>
-              <a:t>17.05.2013</a:t>
+              <a:t>18.11.2013</a:t>
             </a:fld>
             <a:endParaRPr lang="de-DE" dirty="0"/>
           </a:p>
@@ -3623,7 +3843,7 @@
                   <a:srgbClr val="FFFFFF"/>
                 </a:solidFill>
               </a:rPr>
-              <a:t>17.05.2013</a:t>
+              <a:t>18.11.2013</a:t>
             </a:fld>
             <a:endParaRPr lang="de-DE" dirty="0">
               <a:solidFill>
@@ -3836,7 +4056,7 @@
           <a:p>
             <a:fld id="{59E63B7B-3845-4A9C-92D9-43567A6527B7}" type="datetime1">
               <a:rPr lang="de-DE" smtClean="0"/>
-              <a:t>17.05.2013</a:t>
+              <a:t>18.11.2013</a:t>
             </a:fld>
             <a:endParaRPr lang="de-DE" dirty="0"/>
           </a:p>
@@ -4041,7 +4261,7 @@
           <a:p>
             <a:fld id="{786A7219-899B-4060-A3E7-B5F623697A0B}" type="datetime1">
               <a:rPr lang="de-DE" smtClean="0"/>
-              <a:t>17.05.2013</a:t>
+              <a:t>18.11.2013</a:t>
             </a:fld>
             <a:endParaRPr lang="de-DE" dirty="0"/>
           </a:p>
@@ -4213,7 +4433,7 @@
           <a:p>
             <a:fld id="{5674A041-0A0C-40C8-AE31-B8413E504523}" type="datetime1">
               <a:rPr lang="de-DE" smtClean="0"/>
-              <a:t>17.05.2013</a:t>
+              <a:t>18.11.2013</a:t>
             </a:fld>
             <a:endParaRPr lang="de-DE" dirty="0"/>
           </a:p>
@@ -4434,7 +4654,7 @@
           <a:p>
             <a:fld id="{24C9FC74-F4E5-4300-9FB8-F9BFF371C146}" type="datetime1">
               <a:rPr lang="de-DE" smtClean="0"/>
-              <a:t>17.05.2013</a:t>
+              <a:t>18.11.2013</a:t>
             </a:fld>
             <a:endParaRPr lang="de-DE" dirty="0"/>
           </a:p>
@@ -4632,7 +4852,7 @@
           <a:p>
             <a:fld id="{816BAD71-6375-42E4-912E-C8F4172248E5}" type="datetime1">
               <a:rPr lang="de-DE" smtClean="0"/>
-              <a:t>17.05.2013</a:t>
+              <a:t>18.11.2013</a:t>
             </a:fld>
             <a:endParaRPr lang="de-DE" dirty="0"/>
           </a:p>
@@ -5899,7 +6119,7 @@
           <a:p>
             <a:fld id="{58A87F6F-489E-4959-A47F-8AA90A38F76C}" type="datetime1">
               <a:rPr lang="de-DE" smtClean="0"/>
-              <a:t>17.05.2013</a:t>
+              <a:t>18.11.2013</a:t>
             </a:fld>
             <a:endParaRPr lang="de-DE" dirty="0"/>
           </a:p>
@@ -6887,7 +7107,7 @@
           <a:p>
             <a:fld id="{22B79128-11F3-4F70-BD8A-59583365F05C}" type="datetime1">
               <a:rPr lang="de-DE" smtClean="0"/>
-              <a:t>17.05.2013</a:t>
+              <a:t>18.11.2013</a:t>
             </a:fld>
             <a:endParaRPr lang="de-DE" dirty="0"/>
           </a:p>
@@ -7458,7 +7678,7 @@
           <a:p>
             <a:fld id="{D46EB710-88AE-4983-B151-053DAB197452}" type="datetime1">
               <a:rPr lang="de-DE" smtClean="0"/>
-              <a:t>17.05.2013</a:t>
+              <a:t>18.11.2013</a:t>
             </a:fld>
             <a:endParaRPr lang="de-DE" dirty="0"/>
           </a:p>
@@ -8949,7 +9169,7 @@
           <a:p>
             <a:fld id="{B4FED739-4521-4007-A785-763B302D3D0E}" type="datetime1">
               <a:rPr lang="de-DE" smtClean="0"/>
-              <a:t>17.05.2013</a:t>
+              <a:t>18.11.2013</a:t>
             </a:fld>
             <a:endParaRPr lang="de-DE" dirty="0"/>
           </a:p>
@@ -9586,7 +9806,7 @@
           <a:p>
             <a:fld id="{76048893-74DA-46A6-BFBC-44330F1FA4CC}" type="datetime1">
               <a:rPr lang="de-DE" smtClean="0"/>
-              <a:t>17.05.2013</a:t>
+              <a:t>18.11.2013</a:t>
             </a:fld>
             <a:endParaRPr lang="de-DE" dirty="0"/>
           </a:p>
@@ -12424,7 +12644,7 @@
           <a:p>
             <a:fld id="{2CA515B1-FFBE-4443-BF17-D13AF5EAAE2B}" type="datetime1">
               <a:rPr lang="de-DE" smtClean="0"/>
-              <a:t>17.05.2013</a:t>
+              <a:t>18.11.2013</a:t>
             </a:fld>
             <a:endParaRPr lang="de-DE" dirty="0"/>
           </a:p>
@@ -12676,7 +12896,7 @@
           <a:p>
             <a:fld id="{B4547657-EC85-4FBC-8B2B-978331C5CC83}" type="datetime1">
               <a:rPr lang="de-DE" smtClean="0"/>
-              <a:t>17.05.2013</a:t>
+              <a:t>18.11.2013</a:t>
             </a:fld>
             <a:endParaRPr lang="de-DE" dirty="0"/>
           </a:p>
@@ -12734,6 +12954,177 @@
 </file>
 
 <file path=ppt/slides/slide4.xml><?xml version="1.0" encoding="utf-8"?>
+<p:sld xmlns:a="http://schemas.openxmlformats.org/drawingml/2006/main" xmlns:r="http://schemas.openxmlformats.org/officeDocument/2006/relationships" xmlns:p="http://schemas.openxmlformats.org/presentationml/2006/main">
+  <p:cSld>
+    <p:spTree>
+      <p:nvGrpSpPr>
+        <p:cNvPr id="1" name=""/>
+        <p:cNvGrpSpPr/>
+        <p:nvPr/>
+      </p:nvGrpSpPr>
+      <p:grpSpPr>
+        <a:xfrm>
+          <a:off x="0" y="0"/>
+          <a:ext cx="0" cy="0"/>
+          <a:chOff x="0" y="0"/>
+          <a:chExt cx="0" cy="0"/>
+        </a:xfrm>
+      </p:grpSpPr>
+      <p:sp>
+        <p:nvSpPr>
+          <p:cNvPr id="15363" name="Rectangle 1"/>
+          <p:cNvSpPr>
+            <a:spLocks noGrp="1" noChangeArrowheads="1"/>
+          </p:cNvSpPr>
+          <p:nvPr>
+            <p:ph type="title"/>
+          </p:nvPr>
+        </p:nvSpPr>
+        <p:spPr/>
+        <p:txBody>
+          <a:bodyPr tIns="19714"/>
+          <a:lstStyle/>
+          <a:p>
+            <a:pPr>
+              <a:tabLst>
+                <a:tab pos="0" algn="l"/>
+                <a:tab pos="357188" algn="l"/>
+                <a:tab pos="715963" algn="l"/>
+                <a:tab pos="1073150" algn="l"/>
+                <a:tab pos="1431925" algn="l"/>
+                <a:tab pos="1790700" algn="l"/>
+                <a:tab pos="2149475" algn="l"/>
+                <a:tab pos="2508250" algn="l"/>
+                <a:tab pos="2867025" algn="l"/>
+                <a:tab pos="3225800" algn="l"/>
+                <a:tab pos="3584575" algn="l"/>
+                <a:tab pos="3943350" algn="l"/>
+                <a:tab pos="4302125" algn="l"/>
+                <a:tab pos="4660900" algn="l"/>
+                <a:tab pos="5019675" algn="l"/>
+                <a:tab pos="5376863" algn="l"/>
+                <a:tab pos="5735638" algn="l"/>
+                <a:tab pos="6094413" algn="l"/>
+                <a:tab pos="6453188" algn="l"/>
+                <a:tab pos="6811963" algn="l"/>
+                <a:tab pos="7170738" algn="l"/>
+                <a:tab pos="7512050" algn="l"/>
+                <a:tab pos="8089900" algn="l"/>
+              </a:tabLst>
+            </a:pPr>
+            <a:r>
+              <a:rPr lang="de-DE" dirty="0" smtClean="0"/>
+              <a:t>Übungen </a:t>
+            </a:r>
+            <a:r>
+              <a:rPr lang="de-DE" dirty="0" smtClean="0"/>
+              <a:t>1-4 zu </a:t>
+            </a:r>
+            <a:r>
+              <a:rPr lang="de-DE" dirty="0" smtClean="0"/>
+              <a:t>Kapitel </a:t>
+            </a:r>
+            <a:r>
+              <a:rPr lang="de-DE" dirty="0" smtClean="0"/>
+              <a:t>III.E</a:t>
+            </a:r>
+            <a:endParaRPr lang="de-DE" dirty="0" smtClean="0"/>
+          </a:p>
+        </p:txBody>
+      </p:sp>
+      <p:sp>
+        <p:nvSpPr>
+          <p:cNvPr id="3" name="Datumsplatzhalter 2"/>
+          <p:cNvSpPr>
+            <a:spLocks noGrp="1"/>
+          </p:cNvSpPr>
+          <p:nvPr>
+            <p:ph type="dt" sz="half" idx="2"/>
+          </p:nvPr>
+        </p:nvSpPr>
+        <p:spPr/>
+        <p:txBody>
+          <a:bodyPr/>
+          <a:lstStyle/>
+          <a:p>
+            <a:fld id="{CA4C7D18-B015-42C3-98CB-D54F6E43A180}" type="datetime1">
+              <a:rPr lang="de-DE" smtClean="0"/>
+              <a:t>18.11.2013</a:t>
+            </a:fld>
+            <a:endParaRPr lang="de-DE" dirty="0"/>
+          </a:p>
+        </p:txBody>
+      </p:sp>
+      <p:sp>
+        <p:nvSpPr>
+          <p:cNvPr id="4" name="Foliennummernplatzhalter 3"/>
+          <p:cNvSpPr>
+            <a:spLocks noGrp="1"/>
+          </p:cNvSpPr>
+          <p:nvPr>
+            <p:ph type="sldNum" sz="quarter" idx="4"/>
+          </p:nvPr>
+        </p:nvSpPr>
+        <p:spPr/>
+        <p:txBody>
+          <a:bodyPr/>
+          <a:lstStyle/>
+          <a:p>
+            <a:r>
+              <a:rPr lang="de-DE" dirty="0" smtClean="0"/>
+              <a:t>III.E-</a:t>
+            </a:r>
+            <a:fld id="{21FBF85A-D7A6-488B-8C2B-F7E0D6843921}" type="slidenum">
+              <a:rPr lang="de-DE" smtClean="0"/>
+              <a:pPr/>
+              <a:t>4</a:t>
+            </a:fld>
+            <a:endParaRPr lang="de-DE" dirty="0"/>
+          </a:p>
+        </p:txBody>
+      </p:sp>
+    </p:spTree>
+    <p:extLst>
+      <p:ext uri="{BB962C8B-B14F-4D97-AF65-F5344CB8AC3E}">
+        <p14:creationId xmlns:p14="http://schemas.microsoft.com/office/powerpoint/2010/main" val="3873201363"/>
+      </p:ext>
+    </p:extLst>
+  </p:cSld>
+  <p:clrMapOvr>
+    <a:masterClrMapping/>
+  </p:clrMapOvr>
+  <p:transition spd="med"/>
+  <p:timing>
+    <p:tnLst>
+      <p:par>
+        <p:cTn id="1" dur="indefinite" restart="never" nodeType="tmRoot">
+          <p:childTnLst>
+            <p:seq concurrent="1" nextAc="seek">
+              <p:cTn id="2" dur="0" nodeType="mainSeq"/>
+              <p:prevCondLst>
+                <p:cond evt="onPrev" delay="0">
+                  <p:tgtEl>
+                    <p:sldTgt/>
+                  </p:tgtEl>
+                </p:cond>
+              </p:prevCondLst>
+              <p:nextCondLst>
+                <p:cond evt="onNext" delay="0">
+                  <p:tgtEl>
+                    <p:sldTgt/>
+                  </p:tgtEl>
+                </p:cond>
+              </p:nextCondLst>
+            </p:seq>
+          </p:childTnLst>
+        </p:cTn>
+      </p:par>
+    </p:tnLst>
+  </p:timing>
+</p:sld>
+</file>
+
+<file path=ppt/slides/slide5.xml><?xml version="1.0" encoding="utf-8"?>
 <p:sld xmlns:a="http://schemas.openxmlformats.org/drawingml/2006/main" xmlns:r="http://schemas.openxmlformats.org/officeDocument/2006/relationships" xmlns:p="http://schemas.openxmlformats.org/presentationml/2006/main">
   <p:cSld>
     <p:spTree>
@@ -14306,7 +14697,7 @@
           <a:p>
             <a:fld id="{CB5F7D52-2B6A-491A-BB52-AFC394B34CAA}" type="datetime1">
               <a:rPr lang="de-DE" smtClean="0"/>
-              <a:t>17.05.2013</a:t>
+              <a:t>18.11.2013</a:t>
             </a:fld>
             <a:endParaRPr lang="de-DE" dirty="0"/>
           </a:p>
@@ -14334,7 +14725,7 @@
             <a:fld id="{21FBF85A-D7A6-488B-8C2B-F7E0D6843921}" type="slidenum">
               <a:rPr lang="de-DE" smtClean="0"/>
               <a:pPr/>
-              <a:t>4</a:t>
+              <a:t>5</a:t>
             </a:fld>
             <a:endParaRPr lang="de-DE" dirty="0"/>
           </a:p>
@@ -14363,7 +14754,7 @@
 </p:sld>
 </file>
 
-<file path=ppt/slides/slide5.xml><?xml version="1.0" encoding="utf-8"?>
+<file path=ppt/slides/slide6.xml><?xml version="1.0" encoding="utf-8"?>
 <p:sld xmlns:a="http://schemas.openxmlformats.org/drawingml/2006/main" xmlns:r="http://schemas.openxmlformats.org/officeDocument/2006/relationships" xmlns:p="http://schemas.openxmlformats.org/presentationml/2006/main">
   <p:cSld>
     <p:spTree>
@@ -14490,7 +14881,7 @@
           <a:p>
             <a:fld id="{D0A53823-5487-4275-83A4-899CEC680799}" type="datetime1">
               <a:rPr lang="de-DE" smtClean="0"/>
-              <a:t>17.05.2013</a:t>
+              <a:t>18.11.2013</a:t>
             </a:fld>
             <a:endParaRPr lang="de-DE" dirty="0"/>
           </a:p>
@@ -14518,7 +14909,7 @@
             <a:fld id="{21FBF85A-D7A6-488B-8C2B-F7E0D6843921}" type="slidenum">
               <a:rPr lang="de-DE" smtClean="0"/>
               <a:pPr/>
-              <a:t>5</a:t>
+              <a:t>6</a:t>
             </a:fld>
             <a:endParaRPr lang="de-DE" dirty="0"/>
           </a:p>
@@ -14541,6 +14932,177 @@
     <p:tnLst>
       <p:par>
         <p:cTn id="1" dur="indefinite" restart="never" nodeType="tmRoot"/>
+      </p:par>
+    </p:tnLst>
+  </p:timing>
+</p:sld>
+</file>
+
+<file path=ppt/slides/slide7.xml><?xml version="1.0" encoding="utf-8"?>
+<p:sld xmlns:a="http://schemas.openxmlformats.org/drawingml/2006/main" xmlns:r="http://schemas.openxmlformats.org/officeDocument/2006/relationships" xmlns:p="http://schemas.openxmlformats.org/presentationml/2006/main">
+  <p:cSld>
+    <p:spTree>
+      <p:nvGrpSpPr>
+        <p:cNvPr id="1" name=""/>
+        <p:cNvGrpSpPr/>
+        <p:nvPr/>
+      </p:nvGrpSpPr>
+      <p:grpSpPr>
+        <a:xfrm>
+          <a:off x="0" y="0"/>
+          <a:ext cx="0" cy="0"/>
+          <a:chOff x="0" y="0"/>
+          <a:chExt cx="0" cy="0"/>
+        </a:xfrm>
+      </p:grpSpPr>
+      <p:sp>
+        <p:nvSpPr>
+          <p:cNvPr id="15363" name="Rectangle 1"/>
+          <p:cNvSpPr>
+            <a:spLocks noGrp="1" noChangeArrowheads="1"/>
+          </p:cNvSpPr>
+          <p:nvPr>
+            <p:ph type="title"/>
+          </p:nvPr>
+        </p:nvSpPr>
+        <p:spPr/>
+        <p:txBody>
+          <a:bodyPr tIns="19714"/>
+          <a:lstStyle/>
+          <a:p>
+            <a:pPr>
+              <a:tabLst>
+                <a:tab pos="0" algn="l"/>
+                <a:tab pos="357188" algn="l"/>
+                <a:tab pos="715963" algn="l"/>
+                <a:tab pos="1073150" algn="l"/>
+                <a:tab pos="1431925" algn="l"/>
+                <a:tab pos="1790700" algn="l"/>
+                <a:tab pos="2149475" algn="l"/>
+                <a:tab pos="2508250" algn="l"/>
+                <a:tab pos="2867025" algn="l"/>
+                <a:tab pos="3225800" algn="l"/>
+                <a:tab pos="3584575" algn="l"/>
+                <a:tab pos="3943350" algn="l"/>
+                <a:tab pos="4302125" algn="l"/>
+                <a:tab pos="4660900" algn="l"/>
+                <a:tab pos="5019675" algn="l"/>
+                <a:tab pos="5376863" algn="l"/>
+                <a:tab pos="5735638" algn="l"/>
+                <a:tab pos="6094413" algn="l"/>
+                <a:tab pos="6453188" algn="l"/>
+                <a:tab pos="6811963" algn="l"/>
+                <a:tab pos="7170738" algn="l"/>
+                <a:tab pos="7512050" algn="l"/>
+                <a:tab pos="8089900" algn="l"/>
+              </a:tabLst>
+            </a:pPr>
+            <a:r>
+              <a:rPr lang="de-DE" dirty="0" smtClean="0"/>
+              <a:t>Übungen </a:t>
+            </a:r>
+            <a:r>
+              <a:rPr lang="de-DE" dirty="0" smtClean="0"/>
+              <a:t>5 und 6 zu </a:t>
+            </a:r>
+            <a:r>
+              <a:rPr lang="de-DE" dirty="0" smtClean="0"/>
+              <a:t>Kapitel </a:t>
+            </a:r>
+            <a:r>
+              <a:rPr lang="de-DE" dirty="0" smtClean="0"/>
+              <a:t>III.E</a:t>
+            </a:r>
+            <a:endParaRPr lang="de-DE" dirty="0" smtClean="0"/>
+          </a:p>
+        </p:txBody>
+      </p:sp>
+      <p:sp>
+        <p:nvSpPr>
+          <p:cNvPr id="3" name="Datumsplatzhalter 2"/>
+          <p:cNvSpPr>
+            <a:spLocks noGrp="1"/>
+          </p:cNvSpPr>
+          <p:nvPr>
+            <p:ph type="dt" sz="half" idx="2"/>
+          </p:nvPr>
+        </p:nvSpPr>
+        <p:spPr/>
+        <p:txBody>
+          <a:bodyPr/>
+          <a:lstStyle/>
+          <a:p>
+            <a:fld id="{CA4C7D18-B015-42C3-98CB-D54F6E43A180}" type="datetime1">
+              <a:rPr lang="de-DE" smtClean="0"/>
+              <a:t>18.11.2013</a:t>
+            </a:fld>
+            <a:endParaRPr lang="de-DE" dirty="0"/>
+          </a:p>
+        </p:txBody>
+      </p:sp>
+      <p:sp>
+        <p:nvSpPr>
+          <p:cNvPr id="4" name="Foliennummernplatzhalter 3"/>
+          <p:cNvSpPr>
+            <a:spLocks noGrp="1"/>
+          </p:cNvSpPr>
+          <p:nvPr>
+            <p:ph type="sldNum" sz="quarter" idx="4"/>
+          </p:nvPr>
+        </p:nvSpPr>
+        <p:spPr/>
+        <p:txBody>
+          <a:bodyPr/>
+          <a:lstStyle/>
+          <a:p>
+            <a:r>
+              <a:rPr lang="de-DE" dirty="0" smtClean="0"/>
+              <a:t>III.E-</a:t>
+            </a:r>
+            <a:fld id="{21FBF85A-D7A6-488B-8C2B-F7E0D6843921}" type="slidenum">
+              <a:rPr lang="de-DE" smtClean="0"/>
+              <a:pPr/>
+              <a:t>7</a:t>
+            </a:fld>
+            <a:endParaRPr lang="de-DE" dirty="0"/>
+          </a:p>
+        </p:txBody>
+      </p:sp>
+    </p:spTree>
+    <p:extLst>
+      <p:ext uri="{BB962C8B-B14F-4D97-AF65-F5344CB8AC3E}">
+        <p14:creationId xmlns:p14="http://schemas.microsoft.com/office/powerpoint/2010/main" val="1001452741"/>
+      </p:ext>
+    </p:extLst>
+  </p:cSld>
+  <p:clrMapOvr>
+    <a:masterClrMapping/>
+  </p:clrMapOvr>
+  <p:transition spd="med"/>
+  <p:timing>
+    <p:tnLst>
+      <p:par>
+        <p:cTn id="1" dur="indefinite" restart="never" nodeType="tmRoot">
+          <p:childTnLst>
+            <p:seq concurrent="1" nextAc="seek">
+              <p:cTn id="2" dur="0" nodeType="mainSeq"/>
+              <p:prevCondLst>
+                <p:cond evt="onPrev" delay="0">
+                  <p:tgtEl>
+                    <p:sldTgt/>
+                  </p:tgtEl>
+                </p:cond>
+              </p:prevCondLst>
+              <p:nextCondLst>
+                <p:cond evt="onNext" delay="0">
+                  <p:tgtEl>
+                    <p:sldTgt/>
+                  </p:tgtEl>
+                </p:cond>
+              </p:nextCondLst>
+            </p:seq>
+          </p:childTnLst>
+        </p:cTn>
       </p:par>
     </p:tnLst>
   </p:timing>

</xml_diff>